<commit_message>
Fix presenter asterisks on final pres slides
</commit_message>
<xml_diff>
--- a/pres/Volag Final Presentation.pptx
+++ b/pres/Volag Final Presentation.pptx
@@ -13604,7 +13604,11 @@
             </a:pPr>
             <a:r>
               <a:rPr lang="en-US" sz="2000"/>
-              <a:t>Travis Cox*, Alex Hahn*, Cory Sabol, and Josh Moore</a:t>
+              <a:t>Cory Sabol*, Josh Moore*, </a:t>
+            </a:r>
+            <a:r>
+              <a:rPr lang="en-US" sz="2000"/>
+              <a:t>Travis Cox, and Alex Hahn</a:t>
             </a:r>
           </a:p>
           <a:p>
@@ -14953,7 +14957,7 @@
             <a:tbl>
               <a:tblPr>
                 <a:noFill/>
-                <a:tableStyleId>{CFBE7A9E-E388-4AE7-B941-9CEB4840FCC3}</a:tableStyleId>
+                <a:tableStyleId>{8A2E84FA-CCA0-47B5-8583-5066F5180257}</a:tableStyleId>
               </a:tblPr>
               <a:tblGrid>
                 <a:gridCol w="1467575"/>
@@ -15388,7 +15392,7 @@
             <a:tbl>
               <a:tblPr>
                 <a:noFill/>
-                <a:tableStyleId>{CFBE7A9E-E388-4AE7-B941-9CEB4840FCC3}</a:tableStyleId>
+                <a:tableStyleId>{8A2E84FA-CCA0-47B5-8583-5066F5180257}</a:tableStyleId>
               </a:tblPr>
               <a:tblGrid>
                 <a:gridCol w="1467575"/>

</xml_diff>